<commit_message>
Removed mention of inheriting from object when making class in learning_python presentation 22
</commit_message>
<xml_diff>
--- a/python/presentations/learning_python/22_ceda-oop.pptx
+++ b/python/presentations/learning_python/22_ceda-oop.pptx
@@ -693,7 +693,7 @@
               <a:pPr>
                 <a:defRPr/>
               </a:pPr>
-              <a:t>12/10/2018</a:t>
+              <a:t>18/12/2018</a:t>
             </a:fld>
             <a:endParaRPr lang="en-GB"/>
           </a:p>
@@ -930,7 +930,7 @@
               <a:pPr>
                 <a:defRPr/>
               </a:pPr>
-              <a:t>12/10/2018</a:t>
+              <a:t>18/12/2018</a:t>
             </a:fld>
             <a:endParaRPr lang="en-GB"/>
           </a:p>
@@ -1576,7 +1576,7 @@
               <a:pPr>
                 <a:defRPr/>
               </a:pPr>
-              <a:t>12/10/2018</a:t>
+              <a:t>18/12/2018</a:t>
             </a:fld>
             <a:endParaRPr lang="en-GB"/>
           </a:p>
@@ -3254,8 +3254,12 @@
                 <a:latin typeface="Courier New" pitchFamily="49" charset="0"/>
                 <a:cs typeface="Courier New" pitchFamily="49" charset="0"/>
               </a:rPr>
-              <a:t>(object):</a:t>
-            </a:r>
+              <a:t>():</a:t>
+            </a:r>
+            <a:endParaRPr lang="en-US" altLang="en-US" sz="2000" dirty="0" smtClean="0">
+              <a:latin typeface="Courier New" pitchFamily="49" charset="0"/>
+              <a:cs typeface="Courier New" pitchFamily="49" charset="0"/>
+            </a:endParaRPr>
           </a:p>
           <a:p>
             <a:pPr eaLnBrk="1" hangingPunct="1">
@@ -4126,8 +4130,12 @@
                 <a:latin typeface="Courier New" pitchFamily="49" charset="0"/>
                 <a:cs typeface="Courier New" pitchFamily="49" charset="0"/>
               </a:rPr>
-              <a:t>(object):</a:t>
-            </a:r>
+              <a:t>():</a:t>
+            </a:r>
+            <a:endParaRPr lang="en-US" altLang="en-US" sz="2000" dirty="0" smtClean="0">
+              <a:latin typeface="Courier New" pitchFamily="49" charset="0"/>
+              <a:cs typeface="Courier New" pitchFamily="49" charset="0"/>
+            </a:endParaRPr>
           </a:p>
           <a:p>
             <a:pPr eaLnBrk="1" hangingPunct="1">
@@ -8267,8 +8275,12 @@
                 <a:latin typeface="Courier New" pitchFamily="49" charset="0"/>
                 <a:cs typeface="Courier New" pitchFamily="49" charset="0"/>
               </a:rPr>
-              <a:t>(object):</a:t>
-            </a:r>
+              <a:t>():</a:t>
+            </a:r>
+            <a:endParaRPr lang="en-US" altLang="en-US" dirty="0" smtClean="0">
+              <a:latin typeface="Courier New" pitchFamily="49" charset="0"/>
+              <a:cs typeface="Courier New" pitchFamily="49" charset="0"/>
+            </a:endParaRPr>
           </a:p>
           <a:p>
             <a:pPr eaLnBrk="1" hangingPunct="1">
@@ -12616,8 +12628,12 @@
                 <a:latin typeface="Courier New" pitchFamily="49" charset="0"/>
                 <a:cs typeface="Courier New" pitchFamily="49" charset="0"/>
               </a:rPr>
-              <a:t>(object):</a:t>
-            </a:r>
+              <a:t>():</a:t>
+            </a:r>
+            <a:endParaRPr lang="en-US" altLang="en-US" sz="2000" dirty="0" smtClean="0">
+              <a:latin typeface="Courier New" pitchFamily="49" charset="0"/>
+              <a:cs typeface="Courier New" pitchFamily="49" charset="0"/>
+            </a:endParaRPr>
           </a:p>
           <a:p>
             <a:pPr eaLnBrk="1" hangingPunct="1">
@@ -13183,8 +13199,12 @@
                 <a:latin typeface="Courier New" pitchFamily="49" charset="0"/>
                 <a:cs typeface="Courier New" pitchFamily="49" charset="0"/>
               </a:rPr>
-              <a:t>(object):</a:t>
-            </a:r>
+              <a:t>():</a:t>
+            </a:r>
+            <a:endParaRPr lang="en-US" altLang="en-US" sz="2000" dirty="0" smtClean="0">
+              <a:latin typeface="Courier New" pitchFamily="49" charset="0"/>
+              <a:cs typeface="Courier New" pitchFamily="49" charset="0"/>
+            </a:endParaRPr>
           </a:p>
           <a:p>
             <a:pPr eaLnBrk="1" hangingPunct="1">

</xml_diff>